<commit_message>
update to include print_qiime_config.py
</commit_message>
<xml_diff>
--- a/extra/Presentations/2014-08-13-PM_Ashley_Lecture1.pptx
+++ b/extra/Presentations/2014-08-13-PM_Ashley_Lecture1.pptx
@@ -3794,6 +3794,13 @@
   <p:clrMapOvr>
     <a:masterClrMapping/>
   </p:clrMapOvr>
+  <p:timing>
+    <p:tnLst>
+      <p:par>
+        <p:cTn xmlns:p14="http://schemas.microsoft.com/office/powerpoint/2010/main" id="1" dur="indefinite" restart="never" nodeType="tmRoot"/>
+      </p:par>
+    </p:tnLst>
+  </p:timing>
 </p:sld>
 </file>
 
@@ -4782,7 +4789,11 @@
           <a:p>
             <a:r>
               <a:rPr lang="en-US" dirty="0" smtClean="0"/>
-              <a:t>Overview Day 1</a:t>
+              <a:t>Overview </a:t>
+            </a:r>
+            <a:r>
+              <a:rPr lang="en-US" dirty="0" smtClean="0"/>
+              <a:t>Lecture</a:t>
             </a:r>
             <a:endParaRPr lang="en-US" dirty="0"/>
           </a:p>
@@ -5010,6 +5021,284 @@
   <p:clrMapOvr>
     <a:masterClrMapping/>
   </p:clrMapOvr>
+  <p:timing>
+    <p:tnLst>
+      <p:par>
+        <p:cTn xmlns:p14="http://schemas.microsoft.com/office/powerpoint/2010/main" id="1" dur="indefinite" restart="never" nodeType="tmRoot">
+          <p:childTnLst>
+            <p:seq concurrent="1" nextAc="seek">
+              <p:cTn id="2" dur="indefinite" nodeType="mainSeq">
+                <p:childTnLst>
+                  <p:par>
+                    <p:cTn id="3" fill="hold">
+                      <p:stCondLst>
+                        <p:cond delay="indefinite"/>
+                      </p:stCondLst>
+                      <p:childTnLst>
+                        <p:par>
+                          <p:cTn id="4" fill="hold">
+                            <p:stCondLst>
+                              <p:cond delay="0"/>
+                            </p:stCondLst>
+                            <p:childTnLst>
+                              <p:par>
+                                <p:cTn id="5" presetID="1" presetClass="entr" presetSubtype="0" fill="hold" grpId="0" nodeType="clickEffect">
+                                  <p:stCondLst>
+                                    <p:cond delay="0"/>
+                                  </p:stCondLst>
+                                  <p:childTnLst>
+                                    <p:set>
+                                      <p:cBhvr>
+                                        <p:cTn id="6" dur="1" fill="hold">
+                                          <p:stCondLst>
+                                            <p:cond delay="0"/>
+                                          </p:stCondLst>
+                                        </p:cTn>
+                                        <p:tgtEl>
+                                          <p:spTgt spid="3">
+                                            <p:txEl>
+                                              <p:pRg st="0" end="0"/>
+                                            </p:txEl>
+                                          </p:spTgt>
+                                        </p:tgtEl>
+                                        <p:attrNameLst>
+                                          <p:attrName>style.visibility</p:attrName>
+                                        </p:attrNameLst>
+                                      </p:cBhvr>
+                                      <p:to>
+                                        <p:strVal val="visible"/>
+                                      </p:to>
+                                    </p:set>
+                                  </p:childTnLst>
+                                </p:cTn>
+                              </p:par>
+                            </p:childTnLst>
+                          </p:cTn>
+                        </p:par>
+                      </p:childTnLst>
+                    </p:cTn>
+                  </p:par>
+                  <p:par>
+                    <p:cTn id="7" fill="hold">
+                      <p:stCondLst>
+                        <p:cond delay="indefinite"/>
+                      </p:stCondLst>
+                      <p:childTnLst>
+                        <p:par>
+                          <p:cTn id="8" fill="hold">
+                            <p:stCondLst>
+                              <p:cond delay="0"/>
+                            </p:stCondLst>
+                            <p:childTnLst>
+                              <p:par>
+                                <p:cTn id="9" presetID="1" presetClass="entr" presetSubtype="0" fill="hold" grpId="0" nodeType="clickEffect">
+                                  <p:stCondLst>
+                                    <p:cond delay="0"/>
+                                  </p:stCondLst>
+                                  <p:childTnLst>
+                                    <p:set>
+                                      <p:cBhvr>
+                                        <p:cTn id="10" dur="1" fill="hold">
+                                          <p:stCondLst>
+                                            <p:cond delay="0"/>
+                                          </p:stCondLst>
+                                        </p:cTn>
+                                        <p:tgtEl>
+                                          <p:spTgt spid="3">
+                                            <p:txEl>
+                                              <p:pRg st="1" end="1"/>
+                                            </p:txEl>
+                                          </p:spTgt>
+                                        </p:tgtEl>
+                                        <p:attrNameLst>
+                                          <p:attrName>style.visibility</p:attrName>
+                                        </p:attrNameLst>
+                                      </p:cBhvr>
+                                      <p:to>
+                                        <p:strVal val="visible"/>
+                                      </p:to>
+                                    </p:set>
+                                  </p:childTnLst>
+                                </p:cTn>
+                              </p:par>
+                            </p:childTnLst>
+                          </p:cTn>
+                        </p:par>
+                      </p:childTnLst>
+                    </p:cTn>
+                  </p:par>
+                  <p:par>
+                    <p:cTn id="11" fill="hold">
+                      <p:stCondLst>
+                        <p:cond delay="indefinite"/>
+                      </p:stCondLst>
+                      <p:childTnLst>
+                        <p:par>
+                          <p:cTn id="12" fill="hold">
+                            <p:stCondLst>
+                              <p:cond delay="0"/>
+                            </p:stCondLst>
+                            <p:childTnLst>
+                              <p:par>
+                                <p:cTn id="13" presetID="1" presetClass="entr" presetSubtype="0" fill="hold" grpId="0" nodeType="clickEffect">
+                                  <p:stCondLst>
+                                    <p:cond delay="0"/>
+                                  </p:stCondLst>
+                                  <p:childTnLst>
+                                    <p:set>
+                                      <p:cBhvr>
+                                        <p:cTn id="14" dur="1" fill="hold">
+                                          <p:stCondLst>
+                                            <p:cond delay="0"/>
+                                          </p:stCondLst>
+                                        </p:cTn>
+                                        <p:tgtEl>
+                                          <p:spTgt spid="3">
+                                            <p:txEl>
+                                              <p:pRg st="2" end="2"/>
+                                            </p:txEl>
+                                          </p:spTgt>
+                                        </p:tgtEl>
+                                        <p:attrNameLst>
+                                          <p:attrName>style.visibility</p:attrName>
+                                        </p:attrNameLst>
+                                      </p:cBhvr>
+                                      <p:to>
+                                        <p:strVal val="visible"/>
+                                      </p:to>
+                                    </p:set>
+                                  </p:childTnLst>
+                                </p:cTn>
+                              </p:par>
+                            </p:childTnLst>
+                          </p:cTn>
+                        </p:par>
+                      </p:childTnLst>
+                    </p:cTn>
+                  </p:par>
+                  <p:par>
+                    <p:cTn id="15" fill="hold">
+                      <p:stCondLst>
+                        <p:cond delay="indefinite"/>
+                      </p:stCondLst>
+                      <p:childTnLst>
+                        <p:par>
+                          <p:cTn id="16" fill="hold">
+                            <p:stCondLst>
+                              <p:cond delay="0"/>
+                            </p:stCondLst>
+                            <p:childTnLst>
+                              <p:par>
+                                <p:cTn id="17" presetID="1" presetClass="entr" presetSubtype="0" fill="hold" grpId="0" nodeType="clickEffect">
+                                  <p:stCondLst>
+                                    <p:cond delay="0"/>
+                                  </p:stCondLst>
+                                  <p:childTnLst>
+                                    <p:set>
+                                      <p:cBhvr>
+                                        <p:cTn id="18" dur="1" fill="hold">
+                                          <p:stCondLst>
+                                            <p:cond delay="0"/>
+                                          </p:stCondLst>
+                                        </p:cTn>
+                                        <p:tgtEl>
+                                          <p:spTgt spid="3">
+                                            <p:txEl>
+                                              <p:pRg st="3" end="3"/>
+                                            </p:txEl>
+                                          </p:spTgt>
+                                        </p:tgtEl>
+                                        <p:attrNameLst>
+                                          <p:attrName>style.visibility</p:attrName>
+                                        </p:attrNameLst>
+                                      </p:cBhvr>
+                                      <p:to>
+                                        <p:strVal val="visible"/>
+                                      </p:to>
+                                    </p:set>
+                                  </p:childTnLst>
+                                </p:cTn>
+                              </p:par>
+                            </p:childTnLst>
+                          </p:cTn>
+                        </p:par>
+                      </p:childTnLst>
+                    </p:cTn>
+                  </p:par>
+                  <p:par>
+                    <p:cTn id="19" fill="hold">
+                      <p:stCondLst>
+                        <p:cond delay="indefinite"/>
+                      </p:stCondLst>
+                      <p:childTnLst>
+                        <p:par>
+                          <p:cTn id="20" fill="hold">
+                            <p:stCondLst>
+                              <p:cond delay="0"/>
+                            </p:stCondLst>
+                            <p:childTnLst>
+                              <p:par>
+                                <p:cTn id="21" presetID="1" presetClass="entr" presetSubtype="0" fill="hold" grpId="0" nodeType="clickEffect">
+                                  <p:stCondLst>
+                                    <p:cond delay="0"/>
+                                  </p:stCondLst>
+                                  <p:childTnLst>
+                                    <p:set>
+                                      <p:cBhvr>
+                                        <p:cTn id="22" dur="1" fill="hold">
+                                          <p:stCondLst>
+                                            <p:cond delay="0"/>
+                                          </p:stCondLst>
+                                        </p:cTn>
+                                        <p:tgtEl>
+                                          <p:spTgt spid="3">
+                                            <p:txEl>
+                                              <p:pRg st="4" end="4"/>
+                                            </p:txEl>
+                                          </p:spTgt>
+                                        </p:tgtEl>
+                                        <p:attrNameLst>
+                                          <p:attrName>style.visibility</p:attrName>
+                                        </p:attrNameLst>
+                                      </p:cBhvr>
+                                      <p:to>
+                                        <p:strVal val="visible"/>
+                                      </p:to>
+                                    </p:set>
+                                  </p:childTnLst>
+                                </p:cTn>
+                              </p:par>
+                            </p:childTnLst>
+                          </p:cTn>
+                        </p:par>
+                      </p:childTnLst>
+                    </p:cTn>
+                  </p:par>
+                </p:childTnLst>
+              </p:cTn>
+              <p:prevCondLst>
+                <p:cond evt="onPrev" delay="0">
+                  <p:tgtEl>
+                    <p:sldTgt/>
+                  </p:tgtEl>
+                </p:cond>
+              </p:prevCondLst>
+              <p:nextCondLst>
+                <p:cond evt="onNext" delay="0">
+                  <p:tgtEl>
+                    <p:sldTgt/>
+                  </p:tgtEl>
+                </p:cond>
+              </p:nextCondLst>
+            </p:seq>
+          </p:childTnLst>
+        </p:cTn>
+      </p:par>
+    </p:tnLst>
+    <p:bldLst>
+      <p:bldP spid="3" grpId="0" build="p"/>
+    </p:bldLst>
+  </p:timing>
 </p:sld>
 </file>
 
@@ -5066,7 +5355,7 @@
         <p:spPr/>
         <p:txBody>
           <a:bodyPr>
-            <a:normAutofit/>
+            <a:normAutofit lnSpcReduction="10000"/>
           </a:bodyPr>
           <a:lstStyle/>
           <a:p>
@@ -5089,30 +5378,14 @@
             <a:pPr lvl="1" fontAlgn="base"/>
             <a:r>
               <a:rPr lang="en-US" dirty="0" smtClean="0"/>
-              <a:t>Analysis is </a:t>
-            </a:r>
-            <a:r>
-              <a:rPr lang="en-US" dirty="0"/>
-              <a:t>hard.  </a:t>
-            </a:r>
+              <a:t>Analysis is hard.  Have no fear.  It is completely normal to struggle.</a:t>
+            </a:r>
+          </a:p>
+          <a:p>
+            <a:pPr lvl="1" fontAlgn="base"/>
             <a:r>
               <a:rPr lang="en-US" dirty="0" smtClean="0"/>
-              <a:t>Have no fear.  It is normal to </a:t>
-            </a:r>
-          </a:p>
-          <a:p>
-            <a:pPr lvl="1" fontAlgn="base"/>
-            <a:r>
-              <a:rPr lang="en-US" dirty="0" smtClean="0"/>
-              <a:t>Understand </a:t>
-            </a:r>
-            <a:r>
-              <a:rPr lang="en-US" dirty="0"/>
-              <a:t>the problem in the pipeline </a:t>
-            </a:r>
-            <a:r>
-              <a:rPr lang="en-US" dirty="0" smtClean="0"/>
-              <a:t>/where the workflow was breaking down</a:t>
+              <a:t>Understand the problem in the pipeline /where the workflow was breaking down</a:t>
             </a:r>
           </a:p>
           <a:p>
@@ -5174,6 +5447,13 @@
   <p:clrMapOvr>
     <a:masterClrMapping/>
   </p:clrMapOvr>
+  <p:timing>
+    <p:tnLst>
+      <p:par>
+        <p:cTn xmlns:p14="http://schemas.microsoft.com/office/powerpoint/2010/main" id="1" dur="indefinite" restart="never" nodeType="tmRoot"/>
+      </p:par>
+    </p:tnLst>
+  </p:timing>
 </p:sld>
 </file>
 

</xml_diff>